<commit_message>
Nearly final version. Has all working plots
</commit_message>
<xml_diff>
--- a/NFL QB Draft Statistics.pptx
+++ b/NFL QB Draft Statistics.pptx
@@ -6,15 +6,14 @@
   </p:sldMasterIdLst>
   <p:sldIdLst>
     <p:sldId id="256" r:id="rId2"/>
-    <p:sldId id="257" r:id="rId3"/>
-    <p:sldId id="263" r:id="rId4"/>
-    <p:sldId id="264" r:id="rId5"/>
-    <p:sldId id="258" r:id="rId6"/>
-    <p:sldId id="259" r:id="rId7"/>
-    <p:sldId id="260" r:id="rId8"/>
-    <p:sldId id="261" r:id="rId9"/>
-    <p:sldId id="265" r:id="rId10"/>
-    <p:sldId id="262" r:id="rId11"/>
+    <p:sldId id="264" r:id="rId3"/>
+    <p:sldId id="266" r:id="rId4"/>
+    <p:sldId id="258" r:id="rId5"/>
+    <p:sldId id="259" r:id="rId6"/>
+    <p:sldId id="260" r:id="rId7"/>
+    <p:sldId id="261" r:id="rId8"/>
+    <p:sldId id="265" r:id="rId9"/>
+    <p:sldId id="262" r:id="rId10"/>
   </p:sldIdLst>
   <p:sldSz cx="12192000" cy="6858000"/>
   <p:notesSz cx="6858000" cy="9144000"/>
@@ -119,9 +118,8 @@
         <p14:section name="Default Section" id="{A3FF0616-BBE4-438C-A309-3F582011E13B}">
           <p14:sldIdLst>
             <p14:sldId id="256"/>
-            <p14:sldId id="257"/>
-            <p14:sldId id="263"/>
             <p14:sldId id="264"/>
+            <p14:sldId id="266"/>
             <p14:sldId id="258"/>
           </p14:sldIdLst>
         </p14:section>
@@ -339,7 +337,7 @@
           <a:p>
             <a:fld id="{A7798254-4ECD-49B5-8D06-4AF3E396151D}" type="datetimeFigureOut">
               <a:rPr lang="en-US" smtClean="0"/>
-              <a:t>1/31/2022</a:t>
+              <a:t>2/1/2022</a:t>
             </a:fld>
             <a:endParaRPr lang="en-US"/>
           </a:p>
@@ -620,7 +618,7 @@
           <a:p>
             <a:fld id="{A7798254-4ECD-49B5-8D06-4AF3E396151D}" type="datetimeFigureOut">
               <a:rPr lang="en-US" smtClean="0"/>
-              <a:t>1/31/2022</a:t>
+              <a:t>2/1/2022</a:t>
             </a:fld>
             <a:endParaRPr lang="en-US"/>
           </a:p>
@@ -812,7 +810,7 @@
           <a:p>
             <a:fld id="{A7798254-4ECD-49B5-8D06-4AF3E396151D}" type="datetimeFigureOut">
               <a:rPr lang="en-US" smtClean="0"/>
-              <a:t>1/31/2022</a:t>
+              <a:t>2/1/2022</a:t>
             </a:fld>
             <a:endParaRPr lang="en-US"/>
           </a:p>
@@ -1073,7 +1071,7 @@
           <a:p>
             <a:fld id="{A7798254-4ECD-49B5-8D06-4AF3E396151D}" type="datetimeFigureOut">
               <a:rPr lang="en-US" smtClean="0"/>
-              <a:t>1/31/2022</a:t>
+              <a:t>2/1/2022</a:t>
             </a:fld>
             <a:endParaRPr lang="en-US"/>
           </a:p>
@@ -1499,7 +1497,7 @@
           <a:p>
             <a:fld id="{A7798254-4ECD-49B5-8D06-4AF3E396151D}" type="datetimeFigureOut">
               <a:rPr lang="en-US" smtClean="0"/>
-              <a:t>1/31/2022</a:t>
+              <a:t>2/1/2022</a:t>
             </a:fld>
             <a:endParaRPr lang="en-US"/>
           </a:p>
@@ -2045,7 +2043,7 @@
           <a:p>
             <a:fld id="{A7798254-4ECD-49B5-8D06-4AF3E396151D}" type="datetimeFigureOut">
               <a:rPr lang="en-US" smtClean="0"/>
-              <a:t>1/31/2022</a:t>
+              <a:t>2/1/2022</a:t>
             </a:fld>
             <a:endParaRPr lang="en-US"/>
           </a:p>
@@ -2876,7 +2874,7 @@
           <a:p>
             <a:fld id="{A7798254-4ECD-49B5-8D06-4AF3E396151D}" type="datetimeFigureOut">
               <a:rPr lang="en-US" smtClean="0"/>
-              <a:t>1/31/2022</a:t>
+              <a:t>2/1/2022</a:t>
             </a:fld>
             <a:endParaRPr lang="en-US"/>
           </a:p>
@@ -3046,7 +3044,7 @@
           <a:p>
             <a:fld id="{A7798254-4ECD-49B5-8D06-4AF3E396151D}" type="datetimeFigureOut">
               <a:rPr lang="en-US" smtClean="0"/>
-              <a:t>1/31/2022</a:t>
+              <a:t>2/1/2022</a:t>
             </a:fld>
             <a:endParaRPr lang="en-US"/>
           </a:p>
@@ -3226,7 +3224,7 @@
           <a:p>
             <a:fld id="{A7798254-4ECD-49B5-8D06-4AF3E396151D}" type="datetimeFigureOut">
               <a:rPr lang="en-US" smtClean="0"/>
-              <a:t>1/31/2022</a:t>
+              <a:t>2/1/2022</a:t>
             </a:fld>
             <a:endParaRPr lang="en-US"/>
           </a:p>
@@ -3396,7 +3394,7 @@
           <a:p>
             <a:fld id="{A7798254-4ECD-49B5-8D06-4AF3E396151D}" type="datetimeFigureOut">
               <a:rPr lang="en-US" smtClean="0"/>
-              <a:t>1/31/2022</a:t>
+              <a:t>2/1/2022</a:t>
             </a:fld>
             <a:endParaRPr lang="en-US"/>
           </a:p>
@@ -3653,7 +3651,7 @@
           <a:p>
             <a:fld id="{A7798254-4ECD-49B5-8D06-4AF3E396151D}" type="datetimeFigureOut">
               <a:rPr lang="en-US" smtClean="0"/>
-              <a:t>1/31/2022</a:t>
+              <a:t>2/1/2022</a:t>
             </a:fld>
             <a:endParaRPr lang="en-US"/>
           </a:p>
@@ -3885,7 +3883,7 @@
           <a:p>
             <a:fld id="{A7798254-4ECD-49B5-8D06-4AF3E396151D}" type="datetimeFigureOut">
               <a:rPr lang="en-US" smtClean="0"/>
-              <a:t>1/31/2022</a:t>
+              <a:t>2/1/2022</a:t>
             </a:fld>
             <a:endParaRPr lang="en-US"/>
           </a:p>
@@ -4278,7 +4276,7 @@
           <a:p>
             <a:fld id="{A7798254-4ECD-49B5-8D06-4AF3E396151D}" type="datetimeFigureOut">
               <a:rPr lang="en-US" smtClean="0"/>
-              <a:t>1/31/2022</a:t>
+              <a:t>2/1/2022</a:t>
             </a:fld>
             <a:endParaRPr lang="en-US"/>
           </a:p>
@@ -4396,7 +4394,7 @@
           <a:p>
             <a:fld id="{A7798254-4ECD-49B5-8D06-4AF3E396151D}" type="datetimeFigureOut">
               <a:rPr lang="en-US" smtClean="0"/>
-              <a:t>1/31/2022</a:t>
+              <a:t>2/1/2022</a:t>
             </a:fld>
             <a:endParaRPr lang="en-US"/>
           </a:p>
@@ -4491,7 +4489,7 @@
           <a:p>
             <a:fld id="{A7798254-4ECD-49B5-8D06-4AF3E396151D}" type="datetimeFigureOut">
               <a:rPr lang="en-US" smtClean="0"/>
-              <a:t>1/31/2022</a:t>
+              <a:t>2/1/2022</a:t>
             </a:fld>
             <a:endParaRPr lang="en-US"/>
           </a:p>
@@ -4764,7 +4762,7 @@
           <a:p>
             <a:fld id="{A7798254-4ECD-49B5-8D06-4AF3E396151D}" type="datetimeFigureOut">
               <a:rPr lang="en-US" smtClean="0"/>
-              <a:t>1/31/2022</a:t>
+              <a:t>2/1/2022</a:t>
             </a:fld>
             <a:endParaRPr lang="en-US"/>
           </a:p>
@@ -5045,7 +5043,7 @@
           <a:p>
             <a:fld id="{A7798254-4ECD-49B5-8D06-4AF3E396151D}" type="datetimeFigureOut">
               <a:rPr lang="en-US" smtClean="0"/>
-              <a:t>1/31/2022</a:t>
+              <a:t>2/1/2022</a:t>
             </a:fld>
             <a:endParaRPr lang="en-US"/>
           </a:p>
@@ -5285,7 +5283,7 @@
           <a:p>
             <a:fld id="{A7798254-4ECD-49B5-8D06-4AF3E396151D}" type="datetimeFigureOut">
               <a:rPr lang="en-US" smtClean="0"/>
-              <a:t>1/31/2022</a:t>
+              <a:t>2/1/2022</a:t>
             </a:fld>
             <a:endParaRPr lang="en-US"/>
           </a:p>
@@ -5953,132 +5951,6 @@
 </p:sld>
 </file>
 
-<file path=ppt/slides/slide10.xml><?xml version="1.0" encoding="utf-8"?>
-<p:sld xmlns:a="http://schemas.openxmlformats.org/drawingml/2006/main" xmlns:r="http://schemas.openxmlformats.org/officeDocument/2006/relationships" xmlns:p="http://schemas.openxmlformats.org/presentationml/2006/main">
-  <p:cSld>
-    <p:spTree>
-      <p:nvGrpSpPr>
-        <p:cNvPr id="1" name=""/>
-        <p:cNvGrpSpPr/>
-        <p:nvPr/>
-      </p:nvGrpSpPr>
-      <p:grpSpPr>
-        <a:xfrm>
-          <a:off x="0" y="0"/>
-          <a:ext cx="0" cy="0"/>
-          <a:chOff x="0" y="0"/>
-          <a:chExt cx="0" cy="0"/>
-        </a:xfrm>
-      </p:grpSpPr>
-      <p:sp>
-        <p:nvSpPr>
-          <p:cNvPr id="2" name="Title 1">
-            <a:extLst>
-              <a:ext uri="{FF2B5EF4-FFF2-40B4-BE49-F238E27FC236}">
-                <a16:creationId xmlns:a16="http://schemas.microsoft.com/office/drawing/2014/main" id="{22FF57D1-8A6C-450B-A4E5-159EBC1413D4}"/>
-              </a:ext>
-            </a:extLst>
-          </p:cNvPr>
-          <p:cNvSpPr>
-            <a:spLocks noGrp="1"/>
-          </p:cNvSpPr>
-          <p:nvPr>
-            <p:ph type="title"/>
-          </p:nvPr>
-        </p:nvSpPr>
-        <p:spPr/>
-        <p:txBody>
-          <a:bodyPr>
-            <a:normAutofit/>
-          </a:bodyPr>
-          <a:lstStyle/>
-          <a:p>
-            <a:r>
-              <a:rPr lang="en-US" sz="3600" dirty="0"/>
-              <a:t>Conclusions (Mike)</a:t>
-            </a:r>
-          </a:p>
-        </p:txBody>
-      </p:sp>
-      <p:sp>
-        <p:nvSpPr>
-          <p:cNvPr id="3" name="Content Placeholder 2">
-            <a:extLst>
-              <a:ext uri="{FF2B5EF4-FFF2-40B4-BE49-F238E27FC236}">
-                <a16:creationId xmlns:a16="http://schemas.microsoft.com/office/drawing/2014/main" id="{0BE47700-46F0-4185-AC62-E1F5557DD4D5}"/>
-              </a:ext>
-            </a:extLst>
-          </p:cNvPr>
-          <p:cNvSpPr>
-            <a:spLocks noGrp="1"/>
-          </p:cNvSpPr>
-          <p:nvPr>
-            <p:ph idx="1"/>
-          </p:nvPr>
-        </p:nvSpPr>
-        <p:spPr/>
-        <p:txBody>
-          <a:bodyPr>
-            <a:normAutofit/>
-          </a:bodyPr>
-          <a:lstStyle/>
-          <a:p>
-            <a:r>
-              <a:rPr lang="en-US" sz="2000" dirty="0"/>
-              <a:t>Data gathering is non-trivial. Salary information for players needed subscription</a:t>
-            </a:r>
-          </a:p>
-          <a:p>
-            <a:r>
-              <a:rPr lang="en-US" sz="2000" dirty="0"/>
-              <a:t>Drafting in 3</a:t>
-            </a:r>
-            <a:r>
-              <a:rPr lang="en-US" sz="2000" baseline="30000" dirty="0"/>
-              <a:t>rd</a:t>
-            </a:r>
-            <a:r>
-              <a:rPr lang="en-US" sz="2000" dirty="0"/>
-              <a:t>, 4</a:t>
-            </a:r>
-            <a:r>
-              <a:rPr lang="en-US" sz="2000" baseline="30000" dirty="0"/>
-              <a:t>th</a:t>
-            </a:r>
-            <a:r>
-              <a:rPr lang="en-US" sz="2000" dirty="0"/>
-              <a:t> and 5</a:t>
-            </a:r>
-            <a:r>
-              <a:rPr lang="en-US" sz="2000" baseline="30000" dirty="0"/>
-              <a:t>th</a:t>
-            </a:r>
-            <a:r>
-              <a:rPr lang="en-US" sz="2000" dirty="0"/>
-              <a:t> round is not statistically favorable.</a:t>
-            </a:r>
-          </a:p>
-          <a:p>
-            <a:r>
-              <a:rPr lang="en-US" sz="2000" dirty="0"/>
-              <a:t>Drafting a QB in the first round provides the most value when you look at $ per win. </a:t>
-            </a:r>
-          </a:p>
-        </p:txBody>
-      </p:sp>
-    </p:spTree>
-    <p:extLst>
-      <p:ext uri="{BB962C8B-B14F-4D97-AF65-F5344CB8AC3E}">
-        <p14:creationId xmlns:p14="http://schemas.microsoft.com/office/powerpoint/2010/main" val="2668289492"/>
-      </p:ext>
-    </p:extLst>
-  </p:cSld>
-  <p:clrMapOvr>
-    <a:masterClrMapping/>
-  </p:clrMapOvr>
-</p:sld>
-</file>
-
 <file path=ppt/slides/slide2.xml><?xml version="1.0" encoding="utf-8"?>
 <p:sld xmlns:a="http://schemas.openxmlformats.org/drawingml/2006/main" xmlns:r="http://schemas.openxmlformats.org/officeDocument/2006/relationships" xmlns:p="http://schemas.openxmlformats.org/presentationml/2006/main">
   <p:cSld>
@@ -6112,12 +5984,7 @@
             <p:ph type="title"/>
           </p:nvPr>
         </p:nvSpPr>
-        <p:spPr>
-          <a:xfrm>
-            <a:off x="470519" y="348034"/>
-            <a:ext cx="10515600" cy="1325563"/>
-          </a:xfrm>
-        </p:spPr>
+        <p:spPr/>
         <p:txBody>
           <a:bodyPr>
             <a:normAutofit/>
@@ -6126,7 +5993,7 @@
           <a:p>
             <a:r>
               <a:rPr lang="en-US" sz="3600" dirty="0"/>
-              <a:t>Objective and Outline</a:t>
+              <a:t>Data Analysis</a:t>
             </a:r>
           </a:p>
         </p:txBody>
@@ -6149,8 +6016,8 @@
         </p:nvSpPr>
         <p:spPr>
           <a:xfrm>
-            <a:off x="470519" y="1611980"/>
-            <a:ext cx="10233800" cy="4351338"/>
+            <a:off x="326343" y="1364117"/>
+            <a:ext cx="5221898" cy="4351338"/>
           </a:xfrm>
         </p:spPr>
         <p:txBody>
@@ -6159,494 +6026,25 @@
           </a:bodyPr>
           <a:lstStyle/>
           <a:p>
-            <a:pPr marL="0" indent="0">
-              <a:buNone/>
-            </a:pPr>
-            <a:r>
-              <a:rPr lang="en-US" sz="2000" b="1" dirty="0"/>
-              <a:t>Objective: </a:t>
-            </a:r>
-            <a:r>
-              <a:rPr lang="en-US" sz="2000" dirty="0"/>
-              <a:t>Study the past 20 years of NFL Quarterback  data and find answer to this question: </a:t>
-            </a:r>
-          </a:p>
-          <a:p>
-            <a:pPr marL="0" indent="0">
-              <a:buNone/>
-            </a:pPr>
-            <a:r>
-              <a:rPr lang="en-US" sz="2000" dirty="0"/>
-              <a:t> Is it worth it to draft and pay for a first round pick? Which round is the best one to draft a quarterback? </a:t>
-            </a:r>
-          </a:p>
-          <a:p>
-            <a:pPr marL="0" indent="0">
-              <a:buNone/>
-            </a:pPr>
-            <a:endParaRPr lang="en-US" sz="2000" dirty="0"/>
-          </a:p>
-          <a:p>
-            <a:pPr marL="0" indent="0">
-              <a:buNone/>
-            </a:pPr>
-            <a:r>
-              <a:rPr lang="en-US" sz="2000" b="1" dirty="0"/>
-              <a:t>Presentation Outline</a:t>
-            </a:r>
-            <a:endParaRPr lang="en-US" sz="2000" dirty="0"/>
-          </a:p>
-          <a:p>
-            <a:r>
-              <a:rPr lang="en-US" sz="2000" dirty="0"/>
-              <a:t>Data Sources and Cleansing </a:t>
-            </a:r>
-          </a:p>
-          <a:p>
-            <a:r>
-              <a:rPr lang="en-US" sz="2000" dirty="0"/>
-              <a:t>Data Evaluation of draft data </a:t>
-            </a:r>
-          </a:p>
-          <a:p>
-            <a:r>
-              <a:rPr lang="en-US" sz="2000" dirty="0"/>
-              <a:t>Draft round data vs NFL performance metrics</a:t>
-            </a:r>
-          </a:p>
-          <a:p>
-            <a:r>
-              <a:rPr lang="en-US" sz="2000" dirty="0"/>
-              <a:t>NFL performance statistics vs Player Salary</a:t>
-            </a:r>
-          </a:p>
-          <a:p>
-            <a:r>
-              <a:rPr lang="en-US" sz="2000" dirty="0"/>
-              <a:t>Data Outliers</a:t>
-            </a:r>
-          </a:p>
-          <a:p>
-            <a:r>
-              <a:rPr lang="en-US" sz="2000" dirty="0"/>
-              <a:t>Conclusions</a:t>
-            </a:r>
-          </a:p>
-          <a:p>
-            <a:endParaRPr lang="en-US" sz="2000" dirty="0"/>
-          </a:p>
-          <a:p>
-            <a:endParaRPr lang="en-US" sz="2000" dirty="0"/>
-          </a:p>
-        </p:txBody>
-      </p:sp>
-    </p:spTree>
-    <p:extLst>
-      <p:ext uri="{BB962C8B-B14F-4D97-AF65-F5344CB8AC3E}">
-        <p14:creationId xmlns:p14="http://schemas.microsoft.com/office/powerpoint/2010/main" val="2331023719"/>
-      </p:ext>
-    </p:extLst>
-  </p:cSld>
-  <p:clrMapOvr>
-    <a:masterClrMapping/>
-  </p:clrMapOvr>
-</p:sld>
-</file>
-
-<file path=ppt/slides/slide3.xml><?xml version="1.0" encoding="utf-8"?>
-<p:sld xmlns:a="http://schemas.openxmlformats.org/drawingml/2006/main" xmlns:r="http://schemas.openxmlformats.org/officeDocument/2006/relationships" xmlns:p="http://schemas.openxmlformats.org/presentationml/2006/main">
-  <p:cSld>
-    <p:spTree>
-      <p:nvGrpSpPr>
-        <p:cNvPr id="1" name=""/>
-        <p:cNvGrpSpPr/>
-        <p:nvPr/>
-      </p:nvGrpSpPr>
-      <p:grpSpPr>
-        <a:xfrm>
-          <a:off x="0" y="0"/>
-          <a:ext cx="0" cy="0"/>
-          <a:chOff x="0" y="0"/>
-          <a:chExt cx="0" cy="0"/>
-        </a:xfrm>
-      </p:grpSpPr>
-      <p:sp>
-        <p:nvSpPr>
-          <p:cNvPr id="2" name="Title 1">
-            <a:extLst>
-              <a:ext uri="{FF2B5EF4-FFF2-40B4-BE49-F238E27FC236}">
-                <a16:creationId xmlns:a16="http://schemas.microsoft.com/office/drawing/2014/main" id="{6754D4FA-4D93-42B2-B92B-7A3DD9F03A8D}"/>
-              </a:ext>
-            </a:extLst>
-          </p:cNvPr>
-          <p:cNvSpPr>
-            <a:spLocks noGrp="1"/>
-          </p:cNvSpPr>
-          <p:nvPr>
-            <p:ph type="title"/>
-          </p:nvPr>
-        </p:nvSpPr>
-        <p:spPr/>
-        <p:txBody>
-          <a:bodyPr>
-            <a:normAutofit/>
-          </a:bodyPr>
-          <a:lstStyle/>
-          <a:p>
-            <a:r>
-              <a:rPr lang="en-US" sz="3600" dirty="0"/>
-              <a:t>Data Sources and Cleansing (</a:t>
-            </a:r>
-            <a:r>
-              <a:rPr lang="en-US" sz="3600" dirty="0" err="1"/>
-              <a:t>Inder</a:t>
-            </a:r>
-            <a:r>
-              <a:rPr lang="en-US" sz="3600" dirty="0"/>
-              <a:t>) </a:t>
-            </a:r>
-          </a:p>
-        </p:txBody>
-      </p:sp>
-      <p:sp>
-        <p:nvSpPr>
-          <p:cNvPr id="3" name="Content Placeholder 2">
-            <a:extLst>
-              <a:ext uri="{FF2B5EF4-FFF2-40B4-BE49-F238E27FC236}">
-                <a16:creationId xmlns:a16="http://schemas.microsoft.com/office/drawing/2014/main" id="{2E7F7AE0-89FF-429E-9505-7F0DA8FD4588}"/>
-              </a:ext>
-            </a:extLst>
-          </p:cNvPr>
-          <p:cNvSpPr>
-            <a:spLocks noGrp="1"/>
-          </p:cNvSpPr>
-          <p:nvPr>
-            <p:ph idx="1"/>
-          </p:nvPr>
-        </p:nvSpPr>
-        <p:spPr>
-          <a:xfrm>
-            <a:off x="750885" y="1690688"/>
-            <a:ext cx="10233800" cy="4351338"/>
-          </a:xfrm>
-        </p:spPr>
-        <p:txBody>
-          <a:bodyPr>
-            <a:normAutofit fontScale="92500" lnSpcReduction="20000"/>
-          </a:bodyPr>
-          <a:lstStyle/>
-          <a:p>
-            <a:r>
-              <a:rPr lang="en-US" sz="2000" dirty="0"/>
-              <a:t>Data was gathered from www. ??</a:t>
-            </a:r>
-          </a:p>
-          <a:p>
-            <a:r>
-              <a:rPr lang="en-US" sz="2000" dirty="0"/>
-              <a:t>Started with top 100 quarterback data from 2000-2015. Data was saved in 100_stats.csv</a:t>
-            </a:r>
-          </a:p>
-          <a:p>
-            <a:r>
-              <a:rPr lang="en-US" sz="2000" dirty="0"/>
-              <a:t>Went to </a:t>
-            </a:r>
-            <a:r>
-              <a:rPr lang="en-US" sz="2000" dirty="0">
-                <a:hlinkClick r:id="rId2"/>
-              </a:rPr>
-              <a:t>www.?.com</a:t>
-            </a:r>
-            <a:r>
-              <a:rPr lang="en-US" sz="2000" dirty="0"/>
-              <a:t> to get their salaries per year from 2001 to 2020. Information was available per year and saved in separate csv. Used pandas to merge data for all 20 years into a single frame. Exported data in population_salaries_by_season.xlsx</a:t>
-            </a:r>
-          </a:p>
-          <a:p>
-            <a:r>
-              <a:rPr lang="en-US" sz="2000" dirty="0"/>
-              <a:t>Merged the data from 100_stats.csv and population_salaries_by_season.xlsx  into a single file called raw.csv. It had player data as well as their salary information for each year. </a:t>
-            </a:r>
-          </a:p>
-          <a:p>
-            <a:r>
-              <a:rPr lang="en-US" sz="2000" dirty="0"/>
-              <a:t>Some players didn’t have salary information and so had to be dropped from the analysis. At the end, 88 players were used for analysis. </a:t>
-            </a:r>
-          </a:p>
-          <a:p>
-            <a:r>
-              <a:rPr lang="en-US" sz="2000" dirty="0"/>
-              <a:t>Input files can be found in Resources/ folder</a:t>
-            </a:r>
-          </a:p>
-          <a:p>
-            <a:r>
-              <a:rPr lang="en-US" sz="2000" dirty="0"/>
-              <a:t>Cleaning </a:t>
-            </a:r>
-            <a:r>
-              <a:rPr lang="en-US" sz="2000" dirty="0" err="1"/>
-              <a:t>jupyter</a:t>
-            </a:r>
-            <a:r>
-              <a:rPr lang="en-US" sz="2000" dirty="0"/>
-              <a:t> notebooks are:</a:t>
-            </a:r>
-          </a:p>
-          <a:p>
             <a:pPr lvl="1"/>
             <a:r>
-              <a:rPr lang="en-US" sz="1400" dirty="0">
-                <a:solidFill>
-                  <a:srgbClr val="FF0000"/>
-                </a:solidFill>
-              </a:rPr>
-              <a:t>Mike</a:t>
-            </a:r>
-            <a:r>
-              <a:rPr lang="en-US" sz="1400" dirty="0"/>
-              <a:t>: Can you please share your </a:t>
-            </a:r>
-            <a:r>
-              <a:rPr lang="en-US" sz="1400" dirty="0" err="1"/>
-              <a:t>jupyter</a:t>
-            </a:r>
-            <a:r>
-              <a:rPr lang="en-US" sz="1400" dirty="0"/>
-              <a:t> files and input/output files?</a:t>
+              <a:rPr lang="en-US" sz="1600" dirty="0"/>
+              <a:t>First round players had the most wins.</a:t>
             </a:r>
           </a:p>
           <a:p>
             <a:pPr lvl="1"/>
             <a:r>
-              <a:rPr lang="en-US" sz="1400" dirty="0" err="1"/>
-              <a:t>data_cleanup.ipynb</a:t>
-            </a:r>
-            <a:r>
-              <a:rPr lang="en-US" sz="1400" dirty="0"/>
-              <a:t> (input file: </a:t>
-            </a:r>
-            <a:r>
-              <a:rPr lang="fr-FR" sz="1400" b="0" dirty="0" err="1">
-                <a:solidFill>
-                  <a:srgbClr val="2AA198"/>
-                </a:solidFill>
-                <a:effectLst/>
-                <a:latin typeface="Consolas" panose="020B0609020204030204" pitchFamily="49" charset="0"/>
-              </a:rPr>
-              <a:t>Resources</a:t>
-            </a:r>
-            <a:r>
-              <a:rPr lang="fr-FR" sz="1400" b="0" dirty="0">
-                <a:solidFill>
-                  <a:srgbClr val="2AA198"/>
-                </a:solidFill>
-                <a:effectLst/>
-                <a:latin typeface="Consolas" panose="020B0609020204030204" pitchFamily="49" charset="0"/>
-              </a:rPr>
-              <a:t>/</a:t>
-            </a:r>
-            <a:r>
-              <a:rPr lang="fr-FR" sz="1400" b="0" dirty="0" err="1">
-                <a:solidFill>
-                  <a:srgbClr val="2AA198"/>
-                </a:solidFill>
-                <a:effectLst/>
-                <a:latin typeface="Consolas" panose="020B0609020204030204" pitchFamily="49" charset="0"/>
-              </a:rPr>
-              <a:t>Obsolete</a:t>
-            </a:r>
-            <a:r>
-              <a:rPr lang="fr-FR" sz="1400" b="0" dirty="0">
-                <a:solidFill>
-                  <a:srgbClr val="2AA198"/>
-                </a:solidFill>
-                <a:effectLst/>
-                <a:latin typeface="Consolas" panose="020B0609020204030204" pitchFamily="49" charset="0"/>
-              </a:rPr>
-              <a:t>/100_stats.csv, R</a:t>
-            </a:r>
-            <a:r>
-              <a:rPr lang="en-US" sz="1400" b="0" dirty="0" err="1">
-                <a:solidFill>
-                  <a:srgbClr val="2AA198"/>
-                </a:solidFill>
-                <a:effectLst/>
-                <a:latin typeface="Consolas" panose="020B0609020204030204" pitchFamily="49" charset="0"/>
-              </a:rPr>
-              <a:t>esources</a:t>
-            </a:r>
-            <a:r>
-              <a:rPr lang="en-US" sz="1400" b="0" dirty="0">
-                <a:solidFill>
-                  <a:srgbClr val="2AA198"/>
-                </a:solidFill>
-                <a:effectLst/>
-                <a:latin typeface="Consolas" panose="020B0609020204030204" pitchFamily="49" charset="0"/>
-              </a:rPr>
-              <a:t>/Obsolete/population_salaries_by_season.xlsx, Output: Output/raw.csv)</a:t>
-            </a:r>
-            <a:endParaRPr lang="en-US" sz="1400" dirty="0">
-              <a:solidFill>
-                <a:srgbClr val="333333"/>
-              </a:solidFill>
-              <a:latin typeface="Consolas" panose="020B0609020204030204" pitchFamily="49" charset="0"/>
-            </a:endParaRPr>
-          </a:p>
-          <a:p>
-            <a:r>
-              <a:rPr lang="en-US" sz="2000" dirty="0"/>
-              <a:t>Data Analysis was done on </a:t>
-            </a:r>
-            <a:r>
-              <a:rPr lang="en-US" sz="2000" i="1" dirty="0"/>
-              <a:t>raw.csv </a:t>
-            </a:r>
-            <a:r>
-              <a:rPr lang="en-US" sz="2000" dirty="0"/>
-              <a:t>and </a:t>
-            </a:r>
-            <a:r>
-              <a:rPr lang="en-US" sz="2000" i="1" dirty="0"/>
-              <a:t>static_data.csv</a:t>
+              <a:rPr lang="en-US" sz="1600" dirty="0"/>
+              <a:t>Round 3-5 had least wins</a:t>
             </a:r>
           </a:p>
           <a:p>
             <a:pPr lvl="1"/>
-            <a:endParaRPr lang="en-US" sz="1600" dirty="0"/>
-          </a:p>
-        </p:txBody>
-      </p:sp>
-    </p:spTree>
-    <p:extLst>
-      <p:ext uri="{BB962C8B-B14F-4D97-AF65-F5344CB8AC3E}">
-        <p14:creationId xmlns:p14="http://schemas.microsoft.com/office/powerpoint/2010/main" val="1728182779"/>
-      </p:ext>
-    </p:extLst>
-  </p:cSld>
-  <p:clrMapOvr>
-    <a:masterClrMapping/>
-  </p:clrMapOvr>
-</p:sld>
-</file>
-
-<file path=ppt/slides/slide4.xml><?xml version="1.0" encoding="utf-8"?>
-<p:sld xmlns:a="http://schemas.openxmlformats.org/drawingml/2006/main" xmlns:r="http://schemas.openxmlformats.org/officeDocument/2006/relationships" xmlns:p="http://schemas.openxmlformats.org/presentationml/2006/main">
-  <p:cSld>
-    <p:spTree>
-      <p:nvGrpSpPr>
-        <p:cNvPr id="1" name=""/>
-        <p:cNvGrpSpPr/>
-        <p:nvPr/>
-      </p:nvGrpSpPr>
-      <p:grpSpPr>
-        <a:xfrm>
-          <a:off x="0" y="0"/>
-          <a:ext cx="0" cy="0"/>
-          <a:chOff x="0" y="0"/>
-          <a:chExt cx="0" cy="0"/>
-        </a:xfrm>
-      </p:grpSpPr>
-      <p:sp>
-        <p:nvSpPr>
-          <p:cNvPr id="2" name="Title 1">
-            <a:extLst>
-              <a:ext uri="{FF2B5EF4-FFF2-40B4-BE49-F238E27FC236}">
-                <a16:creationId xmlns:a16="http://schemas.microsoft.com/office/drawing/2014/main" id="{6754D4FA-4D93-42B2-B92B-7A3DD9F03A8D}"/>
-              </a:ext>
-            </a:extLst>
-          </p:cNvPr>
-          <p:cNvSpPr>
-            <a:spLocks noGrp="1"/>
-          </p:cNvSpPr>
-          <p:nvPr>
-            <p:ph type="title"/>
-          </p:nvPr>
-        </p:nvSpPr>
-        <p:spPr/>
-        <p:txBody>
-          <a:bodyPr>
-            <a:normAutofit/>
-          </a:bodyPr>
-          <a:lstStyle/>
-          <a:p>
-            <a:r>
-              <a:rPr lang="en-US" sz="3600" dirty="0"/>
-              <a:t>Initial data analysis (Inder) </a:t>
-            </a:r>
-          </a:p>
-        </p:txBody>
-      </p:sp>
-      <p:sp>
-        <p:nvSpPr>
-          <p:cNvPr id="3" name="Content Placeholder 2">
-            <a:extLst>
-              <a:ext uri="{FF2B5EF4-FFF2-40B4-BE49-F238E27FC236}">
-                <a16:creationId xmlns:a16="http://schemas.microsoft.com/office/drawing/2014/main" id="{2E7F7AE0-89FF-429E-9505-7F0DA8FD4588}"/>
-              </a:ext>
-            </a:extLst>
-          </p:cNvPr>
-          <p:cNvSpPr>
-            <a:spLocks noGrp="1"/>
-          </p:cNvSpPr>
-          <p:nvPr>
-            <p:ph idx="1"/>
-          </p:nvPr>
-        </p:nvSpPr>
-        <p:spPr>
-          <a:xfrm>
-            <a:off x="750885" y="1690688"/>
-            <a:ext cx="5221898" cy="4351338"/>
-          </a:xfrm>
-        </p:spPr>
-        <p:txBody>
-          <a:bodyPr>
-            <a:normAutofit/>
-          </a:bodyPr>
-          <a:lstStyle/>
-          <a:p>
-            <a:r>
-              <a:rPr lang="en-US" sz="2000" dirty="0"/>
-              <a:t>Merged static_data.csv and raw.csv in a merged data frame using “Player” name as  the pivot </a:t>
-            </a:r>
-            <a:r>
-              <a:rPr lang="en-US" sz="2000" dirty="0" err="1"/>
-              <a:t>column.Fixed</a:t>
-            </a:r>
-            <a:r>
-              <a:rPr lang="en-US" sz="2000" dirty="0"/>
-              <a:t> column names and selected a subset of the columns for analysis </a:t>
-            </a:r>
-          </a:p>
-          <a:p>
-            <a:r>
-              <a:rPr lang="en-US" sz="2000" dirty="0"/>
-              <a:t>Used </a:t>
-            </a:r>
-            <a:r>
-              <a:rPr lang="en-US" sz="2000" dirty="0" err="1"/>
-              <a:t>groupby</a:t>
-            </a:r>
-            <a:r>
-              <a:rPr lang="en-US" sz="2000" dirty="0"/>
-              <a:t>() and describe() to focus on players. </a:t>
-            </a:r>
-          </a:p>
-          <a:p>
-            <a:pPr lvl="1"/>
             <a:r>
               <a:rPr lang="en-US" sz="1600" dirty="0"/>
-              <a:t>Here is seaborn box plot of Total wins vs. Round pick. </a:t>
-            </a:r>
-          </a:p>
-          <a:p>
-            <a:endParaRPr lang="en-US" sz="2000" dirty="0"/>
-          </a:p>
-          <a:p>
-            <a:pPr lvl="1"/>
-            <a:endParaRPr lang="en-US" sz="1600" dirty="0"/>
+              <a:t>Round 6 and 7 surprisingly had more wins.</a:t>
+            </a:r>
           </a:p>
         </p:txBody>
       </p:sp>
@@ -6672,7 +6070,7 @@
         </p:blipFill>
         <p:spPr>
           <a:xfrm>
-            <a:off x="1151231" y="4156501"/>
+            <a:off x="838200" y="2428356"/>
             <a:ext cx="3267408" cy="2001287"/>
           </a:xfrm>
           <a:prstGeom prst="rect">
@@ -6696,7 +6094,7 @@
         </p:nvSpPr>
         <p:spPr>
           <a:xfrm>
-            <a:off x="6131902" y="1609624"/>
+            <a:off x="6096000" y="1364117"/>
             <a:ext cx="5221898" cy="4351338"/>
           </a:xfrm>
           <a:prstGeom prst="rect">
@@ -7036,111 +6434,562 @@
           </a:prstGeom>
         </p:spPr>
       </p:pic>
-      <p:sp>
-        <p:nvSpPr>
-          <p:cNvPr id="9" name="Rectangle 8">
+    </p:spTree>
+    <p:extLst>
+      <p:ext uri="{BB962C8B-B14F-4D97-AF65-F5344CB8AC3E}">
+        <p14:creationId xmlns:p14="http://schemas.microsoft.com/office/powerpoint/2010/main" val="3655937091"/>
+      </p:ext>
+    </p:extLst>
+  </p:cSld>
+  <p:clrMapOvr>
+    <a:masterClrMapping/>
+  </p:clrMapOvr>
+</p:sld>
+</file>
+
+<file path=ppt/slides/slide3.xml><?xml version="1.0" encoding="utf-8"?>
+<p:sld xmlns:a="http://schemas.openxmlformats.org/drawingml/2006/main" xmlns:r="http://schemas.openxmlformats.org/officeDocument/2006/relationships" xmlns:p="http://schemas.openxmlformats.org/presentationml/2006/main">
+  <p:cSld>
+    <p:spTree>
+      <p:nvGrpSpPr>
+        <p:cNvPr id="1" name=""/>
+        <p:cNvGrpSpPr/>
+        <p:nvPr/>
+      </p:nvGrpSpPr>
+      <p:grpSpPr>
+        <a:xfrm>
+          <a:off x="0" y="0"/>
+          <a:ext cx="0" cy="0"/>
+          <a:chOff x="0" y="0"/>
+          <a:chExt cx="0" cy="0"/>
+        </a:xfrm>
+      </p:grpSpPr>
+      <p:sp>
+        <p:nvSpPr>
+          <p:cNvPr id="2" name="Title 1">
             <a:extLst>
               <a:ext uri="{FF2B5EF4-FFF2-40B4-BE49-F238E27FC236}">
-                <a16:creationId xmlns:a16="http://schemas.microsoft.com/office/drawing/2014/main" id="{298B34CF-4875-49B3-B078-69C26A96363E}"/>
+                <a16:creationId xmlns:a16="http://schemas.microsoft.com/office/drawing/2014/main" id="{6754D4FA-4D93-42B2-B92B-7A3DD9F03A8D}"/>
               </a:ext>
             </a:extLst>
           </p:cNvPr>
-          <p:cNvSpPr/>
+          <p:cNvSpPr>
+            <a:spLocks noGrp="1"/>
+          </p:cNvSpPr>
+          <p:nvPr>
+            <p:ph type="title"/>
+          </p:nvPr>
+        </p:nvSpPr>
+        <p:spPr/>
+        <p:txBody>
+          <a:bodyPr>
+            <a:normAutofit/>
+          </a:bodyPr>
+          <a:lstStyle/>
+          <a:p>
+            <a:r>
+              <a:rPr lang="en-US" sz="3600" dirty="0"/>
+              <a:t>Data Analysis (Colleges/Univ)     (Inder)</a:t>
+            </a:r>
+          </a:p>
+        </p:txBody>
+      </p:sp>
+      <p:sp>
+        <p:nvSpPr>
+          <p:cNvPr id="3" name="Content Placeholder 2">
+            <a:extLst>
+              <a:ext uri="{FF2B5EF4-FFF2-40B4-BE49-F238E27FC236}">
+                <a16:creationId xmlns:a16="http://schemas.microsoft.com/office/drawing/2014/main" id="{2E7F7AE0-89FF-429E-9505-7F0DA8FD4588}"/>
+              </a:ext>
+            </a:extLst>
+          </p:cNvPr>
+          <p:cNvSpPr>
+            <a:spLocks noGrp="1"/>
+          </p:cNvSpPr>
+          <p:nvPr>
+            <p:ph idx="1"/>
+          </p:nvPr>
+        </p:nvSpPr>
+        <p:spPr>
+          <a:xfrm>
+            <a:off x="326343" y="1364117"/>
+            <a:ext cx="5221898" cy="4351338"/>
+          </a:xfrm>
+        </p:spPr>
+        <p:txBody>
+          <a:bodyPr>
+            <a:normAutofit/>
+          </a:bodyPr>
+          <a:lstStyle/>
+          <a:p>
+            <a:pPr lvl="1"/>
+            <a:r>
+              <a:rPr lang="en-US" sz="1600" dirty="0"/>
+              <a:t>USC had the most QB players at 4</a:t>
+            </a:r>
+          </a:p>
+          <a:p>
+            <a:pPr lvl="1"/>
+            <a:r>
+              <a:rPr lang="en-US" sz="1600" dirty="0"/>
+              <a:t>Most of the schools only had 1 player</a:t>
+            </a:r>
+          </a:p>
+        </p:txBody>
+      </p:sp>
+      <p:sp>
+        <p:nvSpPr>
+          <p:cNvPr id="6" name="Content Placeholder 2">
+            <a:extLst>
+              <a:ext uri="{FF2B5EF4-FFF2-40B4-BE49-F238E27FC236}">
+                <a16:creationId xmlns:a16="http://schemas.microsoft.com/office/drawing/2014/main" id="{9B9B362D-F66E-4864-A46C-D3EBED62A0C6}"/>
+              </a:ext>
+            </a:extLst>
+          </p:cNvPr>
+          <p:cNvSpPr txBox="1">
+            <a:spLocks/>
+          </p:cNvSpPr>
           <p:nvPr/>
         </p:nvSpPr>
         <p:spPr>
-          <a:xfrm rot="19970656">
-            <a:off x="1333681" y="2551837"/>
-            <a:ext cx="9524660" cy="2585323"/>
+          <a:xfrm>
+            <a:off x="6096000" y="1364117"/>
+            <a:ext cx="5221898" cy="4351338"/>
           </a:xfrm>
           <a:prstGeom prst="rect">
             <a:avLst/>
           </a:prstGeom>
-          <a:noFill/>
         </p:spPr>
         <p:txBody>
-          <a:bodyPr wrap="none" lIns="91440" tIns="45720" rIns="91440" bIns="45720">
-            <a:spAutoFit/>
+          <a:bodyPr vert="horz" lIns="91440" tIns="45720" rIns="91440" bIns="45720" rtlCol="0">
+            <a:normAutofit/>
           </a:bodyPr>
-          <a:lstStyle/>
-          <a:p>
-            <a:pPr algn="ctr"/>
-            <a:r>
-              <a:rPr lang="en-US" sz="5400" b="1" cap="none" spc="0" dirty="0">
-                <a:ln w="9525">
-                  <a:solidFill>
-                    <a:schemeClr val="bg1"/>
-                  </a:solidFill>
-                  <a:prstDash val="solid"/>
-                </a:ln>
+          <a:lstStyle>
+            <a:lvl1pPr marL="228600" indent="-228600" algn="l" defTabSz="914400" rtl="0" eaLnBrk="1" latinLnBrk="0" hangingPunct="1">
+              <a:lnSpc>
+                <a:spcPct val="90000"/>
+              </a:lnSpc>
+              <a:spcBef>
+                <a:spcPts val="1000"/>
+              </a:spcBef>
+              <a:buFont typeface="Arial" panose="020B0604020202020204" pitchFamily="34" charset="0"/>
+              <a:buChar char="•"/>
+              <a:defRPr sz="2800" kern="1200">
+                <a:gradFill>
+                  <a:gsLst>
+                    <a:gs pos="34000">
+                      <a:schemeClr val="tx1">
+                        <a:lumMod val="93000"/>
+                      </a:schemeClr>
+                    </a:gs>
+                    <a:gs pos="0">
+                      <a:schemeClr val="bg1">
+                        <a:lumMod val="25000"/>
+                        <a:lumOff val="75000"/>
+                      </a:schemeClr>
+                    </a:gs>
+                    <a:gs pos="100000">
+                      <a:schemeClr val="tx2">
+                        <a:lumMod val="0"/>
+                        <a:lumOff val="100000"/>
+                      </a:schemeClr>
+                    </a:gs>
+                  </a:gsLst>
+                  <a:lin ang="4800000" scaled="0"/>
+                </a:gradFill>
+                <a:latin typeface="+mn-lt"/>
+                <a:ea typeface="+mn-ea"/>
+                <a:cs typeface="+mn-cs"/>
+              </a:defRPr>
+            </a:lvl1pPr>
+            <a:lvl2pPr marL="685800" indent="-228600" algn="l" defTabSz="914400" rtl="0" eaLnBrk="1" latinLnBrk="0" hangingPunct="1">
+              <a:lnSpc>
+                <a:spcPct val="90000"/>
+              </a:lnSpc>
+              <a:spcBef>
+                <a:spcPts val="500"/>
+              </a:spcBef>
+              <a:buFont typeface="Arial" panose="020B0604020202020204" pitchFamily="34" charset="0"/>
+              <a:buChar char="•"/>
+              <a:defRPr sz="2400" kern="1200">
+                <a:gradFill>
+                  <a:gsLst>
+                    <a:gs pos="34000">
+                      <a:schemeClr val="tx1">
+                        <a:lumMod val="93000"/>
+                      </a:schemeClr>
+                    </a:gs>
+                    <a:gs pos="0">
+                      <a:schemeClr val="bg1">
+                        <a:lumMod val="25000"/>
+                        <a:lumOff val="75000"/>
+                      </a:schemeClr>
+                    </a:gs>
+                    <a:gs pos="100000">
+                      <a:schemeClr val="tx2">
+                        <a:lumMod val="0"/>
+                        <a:lumOff val="100000"/>
+                      </a:schemeClr>
+                    </a:gs>
+                  </a:gsLst>
+                  <a:lin ang="4800000" scaled="0"/>
+                </a:gradFill>
+                <a:latin typeface="+mn-lt"/>
+                <a:ea typeface="+mn-ea"/>
+                <a:cs typeface="+mn-cs"/>
+              </a:defRPr>
+            </a:lvl2pPr>
+            <a:lvl3pPr marL="1143000" indent="-228600" algn="l" defTabSz="914400" rtl="0" eaLnBrk="1" latinLnBrk="0" hangingPunct="1">
+              <a:lnSpc>
+                <a:spcPct val="90000"/>
+              </a:lnSpc>
+              <a:spcBef>
+                <a:spcPts val="500"/>
+              </a:spcBef>
+              <a:buFont typeface="Arial" panose="020B0604020202020204" pitchFamily="34" charset="0"/>
+              <a:buChar char="•"/>
+              <a:defRPr sz="2000" kern="1200">
+                <a:gradFill>
+                  <a:gsLst>
+                    <a:gs pos="34000">
+                      <a:schemeClr val="tx1">
+                        <a:lumMod val="93000"/>
+                      </a:schemeClr>
+                    </a:gs>
+                    <a:gs pos="0">
+                      <a:schemeClr val="bg1">
+                        <a:lumMod val="25000"/>
+                        <a:lumOff val="75000"/>
+                      </a:schemeClr>
+                    </a:gs>
+                    <a:gs pos="100000">
+                      <a:schemeClr val="tx2">
+                        <a:lumMod val="0"/>
+                        <a:lumOff val="100000"/>
+                      </a:schemeClr>
+                    </a:gs>
+                  </a:gsLst>
+                  <a:lin ang="4800000" scaled="0"/>
+                </a:gradFill>
+                <a:latin typeface="+mn-lt"/>
+                <a:ea typeface="+mn-ea"/>
+                <a:cs typeface="+mn-cs"/>
+              </a:defRPr>
+            </a:lvl3pPr>
+            <a:lvl4pPr marL="1600200" indent="-228600" algn="l" defTabSz="914400" rtl="0" eaLnBrk="1" latinLnBrk="0" hangingPunct="1">
+              <a:lnSpc>
+                <a:spcPct val="90000"/>
+              </a:lnSpc>
+              <a:spcBef>
+                <a:spcPts val="500"/>
+              </a:spcBef>
+              <a:buFont typeface="Arial" panose="020B0604020202020204" pitchFamily="34" charset="0"/>
+              <a:buChar char="•"/>
+              <a:defRPr sz="1800" kern="1200">
+                <a:gradFill>
+                  <a:gsLst>
+                    <a:gs pos="34000">
+                      <a:schemeClr val="tx1">
+                        <a:lumMod val="93000"/>
+                      </a:schemeClr>
+                    </a:gs>
+                    <a:gs pos="0">
+                      <a:schemeClr val="bg1">
+                        <a:lumMod val="25000"/>
+                        <a:lumOff val="75000"/>
+                      </a:schemeClr>
+                    </a:gs>
+                    <a:gs pos="100000">
+                      <a:schemeClr val="tx2">
+                        <a:lumMod val="0"/>
+                        <a:lumOff val="100000"/>
+                      </a:schemeClr>
+                    </a:gs>
+                  </a:gsLst>
+                  <a:lin ang="4800000" scaled="0"/>
+                </a:gradFill>
+                <a:latin typeface="+mn-lt"/>
+                <a:ea typeface="+mn-ea"/>
+                <a:cs typeface="+mn-cs"/>
+              </a:defRPr>
+            </a:lvl4pPr>
+            <a:lvl5pPr marL="2057400" indent="-228600" algn="l" defTabSz="914400" rtl="0" eaLnBrk="1" latinLnBrk="0" hangingPunct="1">
+              <a:lnSpc>
+                <a:spcPct val="90000"/>
+              </a:lnSpc>
+              <a:spcBef>
+                <a:spcPts val="500"/>
+              </a:spcBef>
+              <a:buFont typeface="Arial" panose="020B0604020202020204" pitchFamily="34" charset="0"/>
+              <a:buChar char="•"/>
+              <a:defRPr sz="1800" kern="1200">
+                <a:gradFill>
+                  <a:gsLst>
+                    <a:gs pos="34000">
+                      <a:schemeClr val="tx1">
+                        <a:lumMod val="93000"/>
+                      </a:schemeClr>
+                    </a:gs>
+                    <a:gs pos="0">
+                      <a:schemeClr val="bg1">
+                        <a:lumMod val="25000"/>
+                        <a:lumOff val="75000"/>
+                      </a:schemeClr>
+                    </a:gs>
+                    <a:gs pos="100000">
+                      <a:schemeClr val="tx2">
+                        <a:lumMod val="0"/>
+                        <a:lumOff val="100000"/>
+                      </a:schemeClr>
+                    </a:gs>
+                  </a:gsLst>
+                  <a:lin ang="4800000" scaled="0"/>
+                </a:gradFill>
+                <a:latin typeface="+mn-lt"/>
+                <a:ea typeface="+mn-ea"/>
+                <a:cs typeface="+mn-cs"/>
+              </a:defRPr>
+            </a:lvl5pPr>
+            <a:lvl6pPr marL="2514600" indent="-228600" algn="l" defTabSz="914400" rtl="0" eaLnBrk="1" latinLnBrk="0" hangingPunct="1">
+              <a:lnSpc>
+                <a:spcPct val="90000"/>
+              </a:lnSpc>
+              <a:spcBef>
+                <a:spcPts val="500"/>
+              </a:spcBef>
+              <a:buFont typeface="Arial" panose="020B0604020202020204" pitchFamily="34" charset="0"/>
+              <a:buChar char="•"/>
+              <a:defRPr sz="1800" kern="1200">
                 <a:solidFill>
-                  <a:schemeClr val="accent5"/>
+                  <a:schemeClr val="tx1"/>
                 </a:solidFill>
-                <a:effectLst>
-                  <a:outerShdw blurRad="12700" dist="38100" dir="2700000" algn="tl" rotWithShape="0">
-                    <a:schemeClr val="accent5">
-                      <a:lumMod val="60000"/>
-                      <a:lumOff val="40000"/>
-                    </a:schemeClr>
-                  </a:outerShdw>
-                </a:effectLst>
-              </a:rPr>
-              <a:t>Mike, you can modify or merge </a:t>
-            </a:r>
-          </a:p>
-          <a:p>
-            <a:pPr algn="ctr"/>
-            <a:r>
-              <a:rPr lang="en-US" sz="5400" b="1" cap="none" spc="0" dirty="0">
-                <a:ln w="9525">
-                  <a:solidFill>
-                    <a:schemeClr val="bg1"/>
-                  </a:solidFill>
-                  <a:prstDash val="solid"/>
-                </a:ln>
+                <a:latin typeface="+mn-lt"/>
+                <a:ea typeface="+mn-ea"/>
+                <a:cs typeface="+mn-cs"/>
+              </a:defRPr>
+            </a:lvl6pPr>
+            <a:lvl7pPr marL="2971800" indent="-228600" algn="l" defTabSz="914400" rtl="0" eaLnBrk="1" latinLnBrk="0" hangingPunct="1">
+              <a:lnSpc>
+                <a:spcPct val="90000"/>
+              </a:lnSpc>
+              <a:spcBef>
+                <a:spcPts val="500"/>
+              </a:spcBef>
+              <a:buFont typeface="Arial" panose="020B0604020202020204" pitchFamily="34" charset="0"/>
+              <a:buChar char="•"/>
+              <a:defRPr sz="1800" kern="1200">
                 <a:solidFill>
-                  <a:schemeClr val="accent5"/>
+                  <a:schemeClr val="tx1"/>
                 </a:solidFill>
-                <a:effectLst>
-                  <a:outerShdw blurRad="12700" dist="38100" dir="2700000" algn="tl" rotWithShape="0">
-                    <a:schemeClr val="accent5">
-                      <a:lumMod val="60000"/>
-                      <a:lumOff val="40000"/>
-                    </a:schemeClr>
-                  </a:outerShdw>
-                </a:effectLst>
-              </a:rPr>
-              <a:t>this in your slides</a:t>
-            </a:r>
-          </a:p>
-          <a:p>
-            <a:pPr algn="ctr"/>
-            <a:endParaRPr lang="en-US" sz="5400" b="1" cap="none" spc="0" dirty="0">
-              <a:ln w="9525">
+                <a:latin typeface="+mn-lt"/>
+                <a:ea typeface="+mn-ea"/>
+                <a:cs typeface="+mn-cs"/>
+              </a:defRPr>
+            </a:lvl7pPr>
+            <a:lvl8pPr marL="3429000" indent="-228600" algn="l" defTabSz="914400" rtl="0" eaLnBrk="1" latinLnBrk="0" hangingPunct="1">
+              <a:lnSpc>
+                <a:spcPct val="90000"/>
+              </a:lnSpc>
+              <a:spcBef>
+                <a:spcPts val="500"/>
+              </a:spcBef>
+              <a:buFont typeface="Arial" panose="020B0604020202020204" pitchFamily="34" charset="0"/>
+              <a:buChar char="•"/>
+              <a:defRPr sz="1800" kern="1200">
                 <a:solidFill>
-                  <a:schemeClr val="bg1"/>
+                  <a:schemeClr val="tx1"/>
                 </a:solidFill>
-                <a:prstDash val="solid"/>
-              </a:ln>
-              <a:solidFill>
-                <a:schemeClr val="accent5"/>
-              </a:solidFill>
-              <a:effectLst>
-                <a:outerShdw blurRad="12700" dist="38100" dir="2700000" algn="tl" rotWithShape="0">
-                  <a:schemeClr val="accent5">
-                    <a:lumMod val="60000"/>
-                    <a:lumOff val="40000"/>
-                  </a:schemeClr>
-                </a:outerShdw>
-              </a:effectLst>
-            </a:endParaRPr>
-          </a:p>
-        </p:txBody>
-      </p:sp>
+                <a:latin typeface="+mn-lt"/>
+                <a:ea typeface="+mn-ea"/>
+                <a:cs typeface="+mn-cs"/>
+              </a:defRPr>
+            </a:lvl8pPr>
+            <a:lvl9pPr marL="3886200" indent="-228600" algn="l" defTabSz="914400" rtl="0" eaLnBrk="1" latinLnBrk="0" hangingPunct="1">
+              <a:lnSpc>
+                <a:spcPct val="90000"/>
+              </a:lnSpc>
+              <a:spcBef>
+                <a:spcPts val="500"/>
+              </a:spcBef>
+              <a:buFont typeface="Arial" panose="020B0604020202020204" pitchFamily="34" charset="0"/>
+              <a:buChar char="•"/>
+              <a:defRPr sz="1800" kern="1200">
+                <a:solidFill>
+                  <a:schemeClr val="tx1"/>
+                </a:solidFill>
+                <a:latin typeface="+mn-lt"/>
+                <a:ea typeface="+mn-ea"/>
+                <a:cs typeface="+mn-cs"/>
+              </a:defRPr>
+            </a:lvl9pPr>
+          </a:lstStyle>
+          <a:p>
+            <a:r>
+              <a:rPr lang="en-US" sz="2000" dirty="0"/>
+              <a:t>Here is a heat plot of geolocations of different univ  (weighted by their players’ salaries)</a:t>
+            </a:r>
+            <a:endParaRPr lang="en-US" sz="1600" dirty="0"/>
+          </a:p>
+          <a:p>
+            <a:endParaRPr lang="en-US" sz="2000" dirty="0"/>
+          </a:p>
+          <a:p>
+            <a:pPr lvl="1"/>
+            <a:endParaRPr lang="en-US" sz="1600" dirty="0"/>
+          </a:p>
+        </p:txBody>
+      </p:sp>
+      <p:pic>
+        <p:nvPicPr>
+          <p:cNvPr id="10" name="Picture 9">
+            <a:extLst>
+              <a:ext uri="{FF2B5EF4-FFF2-40B4-BE49-F238E27FC236}">
+                <a16:creationId xmlns:a16="http://schemas.microsoft.com/office/drawing/2014/main" id="{D5F99386-8340-4153-8A03-E4D2620ECB11}"/>
+              </a:ext>
+            </a:extLst>
+          </p:cNvPr>
+          <p:cNvPicPr>
+            <a:picLocks noChangeAspect="1"/>
+          </p:cNvPicPr>
+          <p:nvPr/>
+        </p:nvPicPr>
+        <p:blipFill>
+          <a:blip r:embed="rId2"/>
+          <a:stretch>
+            <a:fillRect/>
+          </a:stretch>
+        </p:blipFill>
+        <p:spPr>
+          <a:xfrm>
+            <a:off x="570329" y="2305505"/>
+            <a:ext cx="4733925" cy="3409950"/>
+          </a:xfrm>
+          <a:prstGeom prst="rect">
+            <a:avLst/>
+          </a:prstGeom>
+        </p:spPr>
+      </p:pic>
+      <p:pic>
+        <p:nvPicPr>
+          <p:cNvPr id="12" name="Picture 11">
+            <a:extLst>
+              <a:ext uri="{FF2B5EF4-FFF2-40B4-BE49-F238E27FC236}">
+                <a16:creationId xmlns:a16="http://schemas.microsoft.com/office/drawing/2014/main" id="{34D9520D-B987-4E41-9270-D7E3A29C9192}"/>
+              </a:ext>
+            </a:extLst>
+          </p:cNvPr>
+          <p:cNvPicPr>
+            <a:picLocks noChangeAspect="1"/>
+          </p:cNvPicPr>
+          <p:nvPr/>
+        </p:nvPicPr>
+        <p:blipFill>
+          <a:blip r:embed="rId3"/>
+          <a:stretch>
+            <a:fillRect/>
+          </a:stretch>
+        </p:blipFill>
+        <p:spPr>
+          <a:xfrm>
+            <a:off x="5582665" y="2402909"/>
+            <a:ext cx="6039006" cy="2600325"/>
+          </a:xfrm>
+          <a:prstGeom prst="rect">
+            <a:avLst/>
+          </a:prstGeom>
+        </p:spPr>
+      </p:pic>
     </p:spTree>
     <p:extLst>
       <p:ext uri="{BB962C8B-B14F-4D97-AF65-F5344CB8AC3E}">
-        <p14:creationId xmlns:p14="http://schemas.microsoft.com/office/powerpoint/2010/main" val="3655937091"/>
+        <p14:creationId xmlns:p14="http://schemas.microsoft.com/office/powerpoint/2010/main" val="3804221751"/>
+      </p:ext>
+    </p:extLst>
+  </p:cSld>
+  <p:clrMapOvr>
+    <a:masterClrMapping/>
+  </p:clrMapOvr>
+</p:sld>
+</file>
+
+<file path=ppt/slides/slide4.xml><?xml version="1.0" encoding="utf-8"?>
+<p:sld xmlns:a="http://schemas.openxmlformats.org/drawingml/2006/main" xmlns:r="http://schemas.openxmlformats.org/officeDocument/2006/relationships" xmlns:p="http://schemas.openxmlformats.org/presentationml/2006/main">
+  <p:cSld>
+    <p:spTree>
+      <p:nvGrpSpPr>
+        <p:cNvPr id="1" name=""/>
+        <p:cNvGrpSpPr/>
+        <p:nvPr/>
+      </p:nvGrpSpPr>
+      <p:grpSpPr>
+        <a:xfrm>
+          <a:off x="0" y="0"/>
+          <a:ext cx="0" cy="0"/>
+          <a:chOff x="0" y="0"/>
+          <a:chExt cx="0" cy="0"/>
+        </a:xfrm>
+      </p:grpSpPr>
+      <p:sp>
+        <p:nvSpPr>
+          <p:cNvPr id="2" name="Title 1">
+            <a:extLst>
+              <a:ext uri="{FF2B5EF4-FFF2-40B4-BE49-F238E27FC236}">
+                <a16:creationId xmlns:a16="http://schemas.microsoft.com/office/drawing/2014/main" id="{16440085-BA36-4F44-A4C6-CD41ECBC8B8F}"/>
+              </a:ext>
+            </a:extLst>
+          </p:cNvPr>
+          <p:cNvSpPr>
+            <a:spLocks noGrp="1"/>
+          </p:cNvSpPr>
+          <p:nvPr>
+            <p:ph type="title"/>
+          </p:nvPr>
+        </p:nvSpPr>
+        <p:spPr/>
+        <p:txBody>
+          <a:bodyPr>
+            <a:normAutofit/>
+          </a:bodyPr>
+          <a:lstStyle/>
+          <a:p>
+            <a:r>
+              <a:rPr lang="en-US" sz="3600" dirty="0"/>
+              <a:t>Evaluation of Draft Data (Chris)</a:t>
+            </a:r>
+          </a:p>
+        </p:txBody>
+      </p:sp>
+      <p:sp>
+        <p:nvSpPr>
+          <p:cNvPr id="3" name="Content Placeholder 2">
+            <a:extLst>
+              <a:ext uri="{FF2B5EF4-FFF2-40B4-BE49-F238E27FC236}">
+                <a16:creationId xmlns:a16="http://schemas.microsoft.com/office/drawing/2014/main" id="{D5B83462-12D0-44A5-91B2-108B72A682EC}"/>
+              </a:ext>
+            </a:extLst>
+          </p:cNvPr>
+          <p:cNvSpPr>
+            <a:spLocks noGrp="1"/>
+          </p:cNvSpPr>
+          <p:nvPr>
+            <p:ph idx="1"/>
+          </p:nvPr>
+        </p:nvSpPr>
+        <p:spPr/>
+        <p:txBody>
+          <a:bodyPr>
+            <a:normAutofit/>
+          </a:bodyPr>
+          <a:lstStyle/>
+          <a:p>
+            <a:endParaRPr lang="en-US" sz="2000" dirty="0"/>
+          </a:p>
+        </p:txBody>
+      </p:sp>
+    </p:spTree>
+    <p:extLst>
+      <p:ext uri="{BB962C8B-B14F-4D97-AF65-F5344CB8AC3E}">
+        <p14:creationId xmlns:p14="http://schemas.microsoft.com/office/powerpoint/2010/main" val="3939758811"/>
       </p:ext>
     </p:extLst>
   </p:cSld>
@@ -7172,7 +7021,7 @@
           <p:cNvPr id="2" name="Title 1">
             <a:extLst>
               <a:ext uri="{FF2B5EF4-FFF2-40B4-BE49-F238E27FC236}">
-                <a16:creationId xmlns:a16="http://schemas.microsoft.com/office/drawing/2014/main" id="{16440085-BA36-4F44-A4C6-CD41ECBC8B8F}"/>
+                <a16:creationId xmlns:a16="http://schemas.microsoft.com/office/drawing/2014/main" id="{CE88D9E2-5AB1-40D4-BF78-A3A0896BA11E}"/>
               </a:ext>
             </a:extLst>
           </p:cNvPr>
@@ -7186,13 +7035,13 @@
         <p:spPr/>
         <p:txBody>
           <a:bodyPr>
-            <a:normAutofit/>
+            <a:noAutofit/>
           </a:bodyPr>
           <a:lstStyle/>
           <a:p>
             <a:r>
               <a:rPr lang="en-US" sz="3600" dirty="0"/>
-              <a:t>Evaluation of Draft Data (Chris)</a:t>
+              <a:t>Draft Round data vs. NFL performance Stats (Abby)</a:t>
             </a:r>
           </a:p>
         </p:txBody>
@@ -7202,7 +7051,7 @@
           <p:cNvPr id="3" name="Content Placeholder 2">
             <a:extLst>
               <a:ext uri="{FF2B5EF4-FFF2-40B4-BE49-F238E27FC236}">
-                <a16:creationId xmlns:a16="http://schemas.microsoft.com/office/drawing/2014/main" id="{D5B83462-12D0-44A5-91B2-108B72A682EC}"/>
+                <a16:creationId xmlns:a16="http://schemas.microsoft.com/office/drawing/2014/main" id="{5E4A29CA-B930-471E-87D1-53F515098899}"/>
               </a:ext>
             </a:extLst>
           </p:cNvPr>
@@ -7227,7 +7076,7 @@
     </p:spTree>
     <p:extLst>
       <p:ext uri="{BB962C8B-B14F-4D97-AF65-F5344CB8AC3E}">
-        <p14:creationId xmlns:p14="http://schemas.microsoft.com/office/powerpoint/2010/main" val="3939758811"/>
+        <p14:creationId xmlns:p14="http://schemas.microsoft.com/office/powerpoint/2010/main" val="3206271923"/>
       </p:ext>
     </p:extLst>
   </p:cSld>
@@ -7259,7 +7108,7 @@
           <p:cNvPr id="2" name="Title 1">
             <a:extLst>
               <a:ext uri="{FF2B5EF4-FFF2-40B4-BE49-F238E27FC236}">
-                <a16:creationId xmlns:a16="http://schemas.microsoft.com/office/drawing/2014/main" id="{CE88D9E2-5AB1-40D4-BF78-A3A0896BA11E}"/>
+                <a16:creationId xmlns:a16="http://schemas.microsoft.com/office/drawing/2014/main" id="{F760BB63-DC07-498D-B1EE-B3902EE6F69A}"/>
               </a:ext>
             </a:extLst>
           </p:cNvPr>
@@ -7273,13 +7122,13 @@
         <p:spPr/>
         <p:txBody>
           <a:bodyPr>
-            <a:noAutofit/>
+            <a:normAutofit/>
           </a:bodyPr>
           <a:lstStyle/>
           <a:p>
             <a:r>
               <a:rPr lang="en-US" sz="3600" dirty="0"/>
-              <a:t>Draft Round data vs. NFL performance Stats (Abby)</a:t>
+              <a:t>NFL Performance vs. Salary (Mike)</a:t>
             </a:r>
           </a:p>
         </p:txBody>
@@ -7289,7 +7138,7 @@
           <p:cNvPr id="3" name="Content Placeholder 2">
             <a:extLst>
               <a:ext uri="{FF2B5EF4-FFF2-40B4-BE49-F238E27FC236}">
-                <a16:creationId xmlns:a16="http://schemas.microsoft.com/office/drawing/2014/main" id="{5E4A29CA-B930-471E-87D1-53F515098899}"/>
+                <a16:creationId xmlns:a16="http://schemas.microsoft.com/office/drawing/2014/main" id="{52C2ED74-4964-4101-B97B-88ACDCBE1233}"/>
               </a:ext>
             </a:extLst>
           </p:cNvPr>
@@ -7314,7 +7163,7 @@
     </p:spTree>
     <p:extLst>
       <p:ext uri="{BB962C8B-B14F-4D97-AF65-F5344CB8AC3E}">
-        <p14:creationId xmlns:p14="http://schemas.microsoft.com/office/powerpoint/2010/main" val="3206271923"/>
+        <p14:creationId xmlns:p14="http://schemas.microsoft.com/office/powerpoint/2010/main" val="446937471"/>
       </p:ext>
     </p:extLst>
   </p:cSld>
@@ -7346,93 +7195,6 @@
           <p:cNvPr id="2" name="Title 1">
             <a:extLst>
               <a:ext uri="{FF2B5EF4-FFF2-40B4-BE49-F238E27FC236}">
-                <a16:creationId xmlns:a16="http://schemas.microsoft.com/office/drawing/2014/main" id="{F760BB63-DC07-498D-B1EE-B3902EE6F69A}"/>
-              </a:ext>
-            </a:extLst>
-          </p:cNvPr>
-          <p:cNvSpPr>
-            <a:spLocks noGrp="1"/>
-          </p:cNvSpPr>
-          <p:nvPr>
-            <p:ph type="title"/>
-          </p:nvPr>
-        </p:nvSpPr>
-        <p:spPr/>
-        <p:txBody>
-          <a:bodyPr>
-            <a:normAutofit/>
-          </a:bodyPr>
-          <a:lstStyle/>
-          <a:p>
-            <a:r>
-              <a:rPr lang="en-US" sz="3600" dirty="0"/>
-              <a:t>NFL Performance vs. Salary (Mike)</a:t>
-            </a:r>
-          </a:p>
-        </p:txBody>
-      </p:sp>
-      <p:sp>
-        <p:nvSpPr>
-          <p:cNvPr id="3" name="Content Placeholder 2">
-            <a:extLst>
-              <a:ext uri="{FF2B5EF4-FFF2-40B4-BE49-F238E27FC236}">
-                <a16:creationId xmlns:a16="http://schemas.microsoft.com/office/drawing/2014/main" id="{52C2ED74-4964-4101-B97B-88ACDCBE1233}"/>
-              </a:ext>
-            </a:extLst>
-          </p:cNvPr>
-          <p:cNvSpPr>
-            <a:spLocks noGrp="1"/>
-          </p:cNvSpPr>
-          <p:nvPr>
-            <p:ph idx="1"/>
-          </p:nvPr>
-        </p:nvSpPr>
-        <p:spPr/>
-        <p:txBody>
-          <a:bodyPr>
-            <a:normAutofit/>
-          </a:bodyPr>
-          <a:lstStyle/>
-          <a:p>
-            <a:endParaRPr lang="en-US" sz="2000" dirty="0"/>
-          </a:p>
-        </p:txBody>
-      </p:sp>
-    </p:spTree>
-    <p:extLst>
-      <p:ext uri="{BB962C8B-B14F-4D97-AF65-F5344CB8AC3E}">
-        <p14:creationId xmlns:p14="http://schemas.microsoft.com/office/powerpoint/2010/main" val="446937471"/>
-      </p:ext>
-    </p:extLst>
-  </p:cSld>
-  <p:clrMapOvr>
-    <a:masterClrMapping/>
-  </p:clrMapOvr>
-</p:sld>
-</file>
-
-<file path=ppt/slides/slide8.xml><?xml version="1.0" encoding="utf-8"?>
-<p:sld xmlns:a="http://schemas.openxmlformats.org/drawingml/2006/main" xmlns:r="http://schemas.openxmlformats.org/officeDocument/2006/relationships" xmlns:p="http://schemas.openxmlformats.org/presentationml/2006/main">
-  <p:cSld>
-    <p:spTree>
-      <p:nvGrpSpPr>
-        <p:cNvPr id="1" name=""/>
-        <p:cNvGrpSpPr/>
-        <p:nvPr/>
-      </p:nvGrpSpPr>
-      <p:grpSpPr>
-        <a:xfrm>
-          <a:off x="0" y="0"/>
-          <a:ext cx="0" cy="0"/>
-          <a:chOff x="0" y="0"/>
-          <a:chExt cx="0" cy="0"/>
-        </a:xfrm>
-      </p:grpSpPr>
-      <p:sp>
-        <p:nvSpPr>
-          <p:cNvPr id="2" name="Title 1">
-            <a:extLst>
-              <a:ext uri="{FF2B5EF4-FFF2-40B4-BE49-F238E27FC236}">
                 <a16:creationId xmlns:a16="http://schemas.microsoft.com/office/drawing/2014/main" id="{930C285F-D983-4775-B63E-A6B087052F69}"/>
               </a:ext>
             </a:extLst>
@@ -7498,7 +7260,7 @@
 </p:sld>
 </file>
 
-<file path=ppt/slides/slide9.xml><?xml version="1.0" encoding="utf-8"?>
+<file path=ppt/slides/slide8.xml><?xml version="1.0" encoding="utf-8"?>
 <p:sld xmlns:a="http://schemas.openxmlformats.org/drawingml/2006/main" xmlns:r="http://schemas.openxmlformats.org/officeDocument/2006/relationships" xmlns:p="http://schemas.openxmlformats.org/presentationml/2006/main">
   <p:cSld>
     <p:spTree>
@@ -7694,6 +7456,132 @@
     <p:extLst>
       <p:ext uri="{BB962C8B-B14F-4D97-AF65-F5344CB8AC3E}">
         <p14:creationId xmlns:p14="http://schemas.microsoft.com/office/powerpoint/2010/main" val="661473128"/>
+      </p:ext>
+    </p:extLst>
+  </p:cSld>
+  <p:clrMapOvr>
+    <a:masterClrMapping/>
+  </p:clrMapOvr>
+</p:sld>
+</file>
+
+<file path=ppt/slides/slide9.xml><?xml version="1.0" encoding="utf-8"?>
+<p:sld xmlns:a="http://schemas.openxmlformats.org/drawingml/2006/main" xmlns:r="http://schemas.openxmlformats.org/officeDocument/2006/relationships" xmlns:p="http://schemas.openxmlformats.org/presentationml/2006/main">
+  <p:cSld>
+    <p:spTree>
+      <p:nvGrpSpPr>
+        <p:cNvPr id="1" name=""/>
+        <p:cNvGrpSpPr/>
+        <p:nvPr/>
+      </p:nvGrpSpPr>
+      <p:grpSpPr>
+        <a:xfrm>
+          <a:off x="0" y="0"/>
+          <a:ext cx="0" cy="0"/>
+          <a:chOff x="0" y="0"/>
+          <a:chExt cx="0" cy="0"/>
+        </a:xfrm>
+      </p:grpSpPr>
+      <p:sp>
+        <p:nvSpPr>
+          <p:cNvPr id="2" name="Title 1">
+            <a:extLst>
+              <a:ext uri="{FF2B5EF4-FFF2-40B4-BE49-F238E27FC236}">
+                <a16:creationId xmlns:a16="http://schemas.microsoft.com/office/drawing/2014/main" id="{22FF57D1-8A6C-450B-A4E5-159EBC1413D4}"/>
+              </a:ext>
+            </a:extLst>
+          </p:cNvPr>
+          <p:cNvSpPr>
+            <a:spLocks noGrp="1"/>
+          </p:cNvSpPr>
+          <p:nvPr>
+            <p:ph type="title"/>
+          </p:nvPr>
+        </p:nvSpPr>
+        <p:spPr/>
+        <p:txBody>
+          <a:bodyPr>
+            <a:normAutofit/>
+          </a:bodyPr>
+          <a:lstStyle/>
+          <a:p>
+            <a:r>
+              <a:rPr lang="en-US" sz="3600" dirty="0"/>
+              <a:t>Conclusions (Mike)</a:t>
+            </a:r>
+          </a:p>
+        </p:txBody>
+      </p:sp>
+      <p:sp>
+        <p:nvSpPr>
+          <p:cNvPr id="3" name="Content Placeholder 2">
+            <a:extLst>
+              <a:ext uri="{FF2B5EF4-FFF2-40B4-BE49-F238E27FC236}">
+                <a16:creationId xmlns:a16="http://schemas.microsoft.com/office/drawing/2014/main" id="{0BE47700-46F0-4185-AC62-E1F5557DD4D5}"/>
+              </a:ext>
+            </a:extLst>
+          </p:cNvPr>
+          <p:cNvSpPr>
+            <a:spLocks noGrp="1"/>
+          </p:cNvSpPr>
+          <p:nvPr>
+            <p:ph idx="1"/>
+          </p:nvPr>
+        </p:nvSpPr>
+        <p:spPr/>
+        <p:txBody>
+          <a:bodyPr>
+            <a:normAutofit/>
+          </a:bodyPr>
+          <a:lstStyle/>
+          <a:p>
+            <a:r>
+              <a:rPr lang="en-US" sz="2000" dirty="0"/>
+              <a:t>Data gathering is non-trivial. Salary information for players needed subscription</a:t>
+            </a:r>
+          </a:p>
+          <a:p>
+            <a:r>
+              <a:rPr lang="en-US" sz="2000" dirty="0"/>
+              <a:t>Drafting in 3</a:t>
+            </a:r>
+            <a:r>
+              <a:rPr lang="en-US" sz="2000" baseline="30000" dirty="0"/>
+              <a:t>rd</a:t>
+            </a:r>
+            <a:r>
+              <a:rPr lang="en-US" sz="2000" dirty="0"/>
+              <a:t>, 4</a:t>
+            </a:r>
+            <a:r>
+              <a:rPr lang="en-US" sz="2000" baseline="30000" dirty="0"/>
+              <a:t>th</a:t>
+            </a:r>
+            <a:r>
+              <a:rPr lang="en-US" sz="2000" dirty="0"/>
+              <a:t> and 5</a:t>
+            </a:r>
+            <a:r>
+              <a:rPr lang="en-US" sz="2000" baseline="30000" dirty="0"/>
+              <a:t>th</a:t>
+            </a:r>
+            <a:r>
+              <a:rPr lang="en-US" sz="2000" dirty="0"/>
+              <a:t> round is not statistically favorable.</a:t>
+            </a:r>
+          </a:p>
+          <a:p>
+            <a:r>
+              <a:rPr lang="en-US" sz="2000" dirty="0"/>
+              <a:t>Drafting a QB in the first round provides the most value when you look at $ per win. </a:t>
+            </a:r>
+          </a:p>
+        </p:txBody>
+      </p:sp>
+    </p:spTree>
+    <p:extLst>
+      <p:ext uri="{BB962C8B-B14F-4D97-AF65-F5344CB8AC3E}">
+        <p14:creationId xmlns:p14="http://schemas.microsoft.com/office/powerpoint/2010/main" val="2668289492"/>
       </p:ext>
     </p:extLst>
   </p:cSld>

</xml_diff>